<commit_message>
added rating filter plus documentation
</commit_message>
<xml_diff>
--- a/doc/slides.pptx
+++ b/doc/slides.pptx
@@ -231,11 +231,11 @@
           <c:showBubbleSize val="0"/>
         </c:dLbls>
         <c:gapWidth val="150"/>
-        <c:axId val="-2109568184"/>
-        <c:axId val="-2109566248"/>
+        <c:axId val="-2108053976"/>
+        <c:axId val="-2107654824"/>
       </c:barChart>
       <c:catAx>
-        <c:axId val="-2109568184"/>
+        <c:axId val="-2108053976"/>
         <c:scaling>
           <c:orientation val="minMax"/>
         </c:scaling>
@@ -244,7 +244,7 @@
         <c:majorTickMark val="out"/>
         <c:minorTickMark val="none"/>
         <c:tickLblPos val="nextTo"/>
-        <c:crossAx val="-2109566248"/>
+        <c:crossAx val="-2107654824"/>
         <c:crosses val="autoZero"/>
         <c:auto val="1"/>
         <c:lblAlgn val="ctr"/>
@@ -252,7 +252,7 @@
         <c:noMultiLvlLbl val="0"/>
       </c:catAx>
       <c:valAx>
-        <c:axId val="-2109566248"/>
+        <c:axId val="-2107654824"/>
         <c:scaling>
           <c:orientation val="minMax"/>
         </c:scaling>
@@ -263,7 +263,7 @@
         <c:majorTickMark val="out"/>
         <c:minorTickMark val="none"/>
         <c:tickLblPos val="nextTo"/>
-        <c:crossAx val="-2109568184"/>
+        <c:crossAx val="-2108053976"/>
         <c:crosses val="autoZero"/>
         <c:crossBetween val="between"/>
       </c:valAx>
@@ -309,7 +309,7 @@
           <c:order val="0"/>
           <c:tx>
             <c:strRef>
-              <c:f>Blatt1!$A$17</c:f>
+              <c:f>Blatt1!$A$28</c:f>
               <c:strCache>
                 <c:ptCount val="1"/>
                 <c:pt idx="0">
@@ -321,47 +321,77 @@
           <c:invertIfNegative val="0"/>
           <c:cat>
             <c:strRef>
-              <c:f>Blatt1!$B$16:$F$16</c:f>
+              <c:f>Blatt1!$B$27:$K$27</c:f>
               <c:strCache>
-                <c:ptCount val="5"/>
+                <c:ptCount val="10"/>
                 <c:pt idx="0">
-                  <c:v>Ngram 1000/1000</c:v>
+                  <c:v>NGramm 10000 No Attribute Selection/No IDF/TF</c:v>
                 </c:pt>
                 <c:pt idx="1">
+                  <c:v>NGramm 10000 No Attribute Selection</c:v>
+                </c:pt>
+                <c:pt idx="2">
+                  <c:v>NGramm 10000 No Attribute Selection, Operate On Per Class Base (false)</c:v>
+                </c:pt>
+                <c:pt idx="3">
+                  <c:v>NGramm 1000/1000</c:v>
+                </c:pt>
+                <c:pt idx="4">
                   <c:v>Ngramm 1000/100</c:v>
                 </c:pt>
-                <c:pt idx="2">
+                <c:pt idx="5">
                   <c:v>Ngramm 10000/500</c:v>
                 </c:pt>
-                <c:pt idx="3">
+                <c:pt idx="6">
                   <c:v>Ngramm 10000/500</c:v>
                 </c:pt>
-                <c:pt idx="4">
+                <c:pt idx="7">
+                  <c:v>Ngramm 15000/1000</c:v>
+                </c:pt>
+                <c:pt idx="8">
                   <c:v>Normal Tokenize</c:v>
+                </c:pt>
+                <c:pt idx="9">
+                  <c:v>Ngramm 10000/500 (tokenize only)</c:v>
                 </c:pt>
               </c:strCache>
             </c:strRef>
           </c:cat>
           <c:val>
             <c:numRef>
-              <c:f>Blatt1!$B$17:$F$17</c:f>
+              <c:f>Blatt1!$B$28:$K$28</c:f>
               <c:numCache>
                 <c:formatCode>0.00%</c:formatCode>
-                <c:ptCount val="5"/>
+                <c:ptCount val="10"/>
                 <c:pt idx="0">
-                  <c:v>0.7905</c:v>
+                  <c:v>0.795</c:v>
                 </c:pt>
                 <c:pt idx="1">
-                  <c:v>0.7905</c:v>
+                  <c:v>0.795</c:v>
                 </c:pt>
                 <c:pt idx="2">
-                  <c:v>0.8555</c:v>
+                  <c:v>0.7985</c:v>
                 </c:pt>
                 <c:pt idx="3">
-                  <c:v>0.851</c:v>
+                  <c:v>0.77</c:v>
                 </c:pt>
                 <c:pt idx="4">
-                  <c:v>0.8535</c:v>
+                  <c:v>0.7995</c:v>
+                </c:pt>
+                <c:pt idx="5">
+                  <c:v>0.853</c:v>
+                </c:pt>
+                <c:pt idx="6">
+                  <c:v>0.8575</c:v>
+                </c:pt>
+                <c:pt idx="7">
+                  <c:v>0.8545</c:v>
+                </c:pt>
+                <c:pt idx="8">
+                  <c:v>0.848</c:v>
+                </c:pt>
+                <c:pt idx="9">
+                  <c:v>0.8085</c:v>
                 </c:pt>
               </c:numCache>
             </c:numRef>
@@ -372,7 +402,7 @@
           <c:order val="1"/>
           <c:tx>
             <c:strRef>
-              <c:f>Blatt1!$A$18</c:f>
+              <c:f>Blatt1!$A$29</c:f>
               <c:strCache>
                 <c:ptCount val="1"/>
                 <c:pt idx="0">
@@ -384,47 +414,77 @@
           <c:invertIfNegative val="0"/>
           <c:cat>
             <c:strRef>
-              <c:f>Blatt1!$B$16:$F$16</c:f>
+              <c:f>Blatt1!$B$27:$K$27</c:f>
               <c:strCache>
-                <c:ptCount val="5"/>
+                <c:ptCount val="10"/>
                 <c:pt idx="0">
-                  <c:v>Ngram 1000/1000</c:v>
+                  <c:v>NGramm 10000 No Attribute Selection/No IDF/TF</c:v>
                 </c:pt>
                 <c:pt idx="1">
+                  <c:v>NGramm 10000 No Attribute Selection</c:v>
+                </c:pt>
+                <c:pt idx="2">
+                  <c:v>NGramm 10000 No Attribute Selection, Operate On Per Class Base (false)</c:v>
+                </c:pt>
+                <c:pt idx="3">
+                  <c:v>NGramm 1000/1000</c:v>
+                </c:pt>
+                <c:pt idx="4">
                   <c:v>Ngramm 1000/100</c:v>
                 </c:pt>
-                <c:pt idx="2">
+                <c:pt idx="5">
                   <c:v>Ngramm 10000/500</c:v>
                 </c:pt>
-                <c:pt idx="3">
+                <c:pt idx="6">
                   <c:v>Ngramm 10000/500</c:v>
                 </c:pt>
-                <c:pt idx="4">
+                <c:pt idx="7">
+                  <c:v>Ngramm 15000/1000</c:v>
+                </c:pt>
+                <c:pt idx="8">
                   <c:v>Normal Tokenize</c:v>
+                </c:pt>
+                <c:pt idx="9">
+                  <c:v>Ngramm 10000/500 (tokenize only)</c:v>
                 </c:pt>
               </c:strCache>
             </c:strRef>
           </c:cat>
           <c:val>
             <c:numRef>
-              <c:f>Blatt1!$B$18:$F$18</c:f>
+              <c:f>Blatt1!$B$29:$K$29</c:f>
               <c:numCache>
                 <c:formatCode>0.00%</c:formatCode>
-                <c:ptCount val="5"/>
+                <c:ptCount val="10"/>
                 <c:pt idx="0">
-                  <c:v>0.2095</c:v>
+                  <c:v>0.205</c:v>
                 </c:pt>
                 <c:pt idx="1">
-                  <c:v>0.2095</c:v>
+                  <c:v>0.205</c:v>
                 </c:pt>
                 <c:pt idx="2">
-                  <c:v>0.1445</c:v>
+                  <c:v>0.2015</c:v>
                 </c:pt>
                 <c:pt idx="3">
-                  <c:v>0.149</c:v>
+                  <c:v>0.23</c:v>
                 </c:pt>
                 <c:pt idx="4">
-                  <c:v>0.1465</c:v>
+                  <c:v>0.2005</c:v>
+                </c:pt>
+                <c:pt idx="5">
+                  <c:v>0.147</c:v>
+                </c:pt>
+                <c:pt idx="6">
+                  <c:v>0.1425</c:v>
+                </c:pt>
+                <c:pt idx="7">
+                  <c:v>0.1455</c:v>
+                </c:pt>
+                <c:pt idx="8">
+                  <c:v>0.152</c:v>
+                </c:pt>
+                <c:pt idx="9">
+                  <c:v>0.1915</c:v>
                 </c:pt>
               </c:numCache>
             </c:numRef>
@@ -439,11 +499,11 @@
           <c:showBubbleSize val="0"/>
         </c:dLbls>
         <c:gapWidth val="150"/>
-        <c:axId val="-2105776488"/>
-        <c:axId val="-2105773448"/>
+        <c:axId val="-2117663544"/>
+        <c:axId val="-2107456520"/>
       </c:barChart>
       <c:catAx>
-        <c:axId val="-2105776488"/>
+        <c:axId val="-2117663544"/>
         <c:scaling>
           <c:orientation val="minMax"/>
         </c:scaling>
@@ -452,7 +512,7 @@
         <c:majorTickMark val="out"/>
         <c:minorTickMark val="none"/>
         <c:tickLblPos val="nextTo"/>
-        <c:crossAx val="-2105773448"/>
+        <c:crossAx val="-2107456520"/>
         <c:crosses val="autoZero"/>
         <c:auto val="1"/>
         <c:lblAlgn val="ctr"/>
@@ -460,7 +520,7 @@
         <c:noMultiLvlLbl val="0"/>
       </c:catAx>
       <c:valAx>
-        <c:axId val="-2105773448"/>
+        <c:axId val="-2107456520"/>
         <c:scaling>
           <c:orientation val="minMax"/>
         </c:scaling>
@@ -471,7 +531,7 @@
         <c:majorTickMark val="out"/>
         <c:minorTickMark val="none"/>
         <c:tickLblPos val="nextTo"/>
-        <c:crossAx val="-2105776488"/>
+        <c:crossAx val="-2117663544"/>
         <c:crosses val="autoZero"/>
         <c:crossBetween val="between"/>
       </c:valAx>
@@ -5809,9 +5869,16 @@
             <p:ph idx="1"/>
           </p:nvPr>
         </p:nvSpPr>
-        <p:spPr/>
-        <p:txBody>
-          <a:bodyPr/>
+        <p:spPr>
+          <a:xfrm>
+            <a:off x="415925" y="2756646"/>
+            <a:ext cx="4017873" cy="3491753"/>
+          </a:xfrm>
+        </p:spPr>
+        <p:txBody>
+          <a:bodyPr>
+            <a:normAutofit/>
+          </a:bodyPr>
           <a:lstStyle/>
           <a:p>
             <a:r>
@@ -5835,7 +5902,7 @@
           <a:p>
             <a:r>
               <a:rPr lang="de-DE" dirty="0" err="1" smtClean="0"/>
-              <a:t>Stopwordlists</a:t>
+              <a:t>Stopwordlist</a:t>
             </a:r>
             <a:endParaRPr lang="de-DE" dirty="0" smtClean="0"/>
           </a:p>
@@ -5849,6 +5916,309 @@
               <a:t>Tokenizers</a:t>
             </a:r>
             <a:endParaRPr lang="de-DE" dirty="0" smtClean="0"/>
+          </a:p>
+          <a:p>
+            <a:r>
+              <a:rPr lang="de-DE" dirty="0" smtClean="0"/>
+              <a:t>Special </a:t>
+            </a:r>
+            <a:r>
+              <a:rPr lang="de-DE" dirty="0" err="1" smtClean="0"/>
+              <a:t>Character</a:t>
+            </a:r>
+            <a:r>
+              <a:rPr lang="de-DE" dirty="0" smtClean="0"/>
+              <a:t> </a:t>
+            </a:r>
+            <a:r>
+              <a:rPr lang="de-DE" dirty="0" err="1" smtClean="0"/>
+              <a:t>Replacement</a:t>
+            </a:r>
+            <a:endParaRPr lang="de-DE" dirty="0" smtClean="0"/>
+          </a:p>
+          <a:p>
+            <a:r>
+              <a:rPr lang="de-DE" dirty="0" smtClean="0"/>
+              <a:t>Negation Filter</a:t>
+            </a:r>
+          </a:p>
+        </p:txBody>
+      </p:sp>
+      <p:sp>
+        <p:nvSpPr>
+          <p:cNvPr id="4" name="Inhaltsplatzhalter 2"/>
+          <p:cNvSpPr txBox="1">
+            <a:spLocks/>
+          </p:cNvSpPr>
+          <p:nvPr/>
+        </p:nvSpPr>
+        <p:spPr>
+          <a:xfrm>
+            <a:off x="4586198" y="2909046"/>
+            <a:ext cx="4017873" cy="3491753"/>
+          </a:xfrm>
+          <a:prstGeom prst="rect">
+            <a:avLst/>
+          </a:prstGeom>
+        </p:spPr>
+        <p:txBody>
+          <a:bodyPr vert="horz" lIns="91440" tIns="45720" rIns="91440" bIns="45720" rtlCol="0">
+            <a:normAutofit/>
+          </a:bodyPr>
+          <a:lstStyle>
+            <a:lvl1pPr marL="228600" indent="-228600" algn="l" defTabSz="914400" rtl="0" eaLnBrk="1" latinLnBrk="0" hangingPunct="1">
+              <a:spcBef>
+                <a:spcPts val="2000"/>
+              </a:spcBef>
+              <a:buClr>
+                <a:schemeClr val="tx1">
+                  <a:lumMod val="50000"/>
+                  <a:lumOff val="50000"/>
+                </a:schemeClr>
+              </a:buClr>
+              <a:buSzPct val="70000"/>
+              <a:buFont typeface="Wingdings" pitchFamily="2" charset="2"/>
+              <a:buChar char="l"/>
+              <a:defRPr sz="2000" kern="1200">
+                <a:solidFill>
+                  <a:schemeClr val="tx1">
+                    <a:lumMod val="75000"/>
+                    <a:lumOff val="25000"/>
+                  </a:schemeClr>
+                </a:solidFill>
+                <a:latin typeface="+mn-lt"/>
+                <a:ea typeface="+mn-ea"/>
+                <a:cs typeface="+mn-cs"/>
+              </a:defRPr>
+            </a:lvl1pPr>
+            <a:lvl2pPr marL="457200" indent="-228600" algn="l" defTabSz="914400" rtl="0" eaLnBrk="1" latinLnBrk="0" hangingPunct="1">
+              <a:spcBef>
+                <a:spcPts val="600"/>
+              </a:spcBef>
+              <a:buClr>
+                <a:schemeClr val="tx1">
+                  <a:lumMod val="85000"/>
+                  <a:lumOff val="15000"/>
+                </a:schemeClr>
+              </a:buClr>
+              <a:buSzPct val="70000"/>
+              <a:buFont typeface="Wingdings" pitchFamily="2" charset="2"/>
+              <a:buChar char="l"/>
+              <a:defRPr sz="1800" kern="1200">
+                <a:solidFill>
+                  <a:schemeClr val="tx1">
+                    <a:lumMod val="75000"/>
+                    <a:lumOff val="25000"/>
+                  </a:schemeClr>
+                </a:solidFill>
+                <a:latin typeface="+mn-lt"/>
+                <a:ea typeface="+mn-ea"/>
+                <a:cs typeface="+mn-cs"/>
+              </a:defRPr>
+            </a:lvl2pPr>
+            <a:lvl3pPr marL="685800" indent="-228600" algn="l" defTabSz="914400" rtl="0" eaLnBrk="1" latinLnBrk="0" hangingPunct="1">
+              <a:spcBef>
+                <a:spcPts val="600"/>
+              </a:spcBef>
+              <a:buClr>
+                <a:schemeClr val="tx1">
+                  <a:lumMod val="50000"/>
+                  <a:lumOff val="50000"/>
+                </a:schemeClr>
+              </a:buClr>
+              <a:buSzPct val="70000"/>
+              <a:buFont typeface="Wingdings" pitchFamily="2" charset="2"/>
+              <a:buChar char="l"/>
+              <a:defRPr sz="1800" kern="1200">
+                <a:solidFill>
+                  <a:schemeClr val="tx1">
+                    <a:lumMod val="75000"/>
+                    <a:lumOff val="25000"/>
+                  </a:schemeClr>
+                </a:solidFill>
+                <a:latin typeface="+mn-lt"/>
+                <a:ea typeface="+mn-ea"/>
+                <a:cs typeface="+mn-cs"/>
+              </a:defRPr>
+            </a:lvl3pPr>
+            <a:lvl4pPr marL="914400" indent="-228600" algn="l" defTabSz="914400" rtl="0" eaLnBrk="1" latinLnBrk="0" hangingPunct="1">
+              <a:spcBef>
+                <a:spcPts val="600"/>
+              </a:spcBef>
+              <a:buClr>
+                <a:schemeClr val="tx1">
+                  <a:lumMod val="85000"/>
+                  <a:lumOff val="15000"/>
+                </a:schemeClr>
+              </a:buClr>
+              <a:buSzPct val="70000"/>
+              <a:buFont typeface="Wingdings" pitchFamily="2" charset="2"/>
+              <a:buChar char="l"/>
+              <a:defRPr sz="1800" kern="1200">
+                <a:solidFill>
+                  <a:schemeClr val="tx1">
+                    <a:lumMod val="75000"/>
+                    <a:lumOff val="25000"/>
+                  </a:schemeClr>
+                </a:solidFill>
+                <a:latin typeface="+mn-lt"/>
+                <a:ea typeface="+mn-ea"/>
+                <a:cs typeface="+mn-cs"/>
+              </a:defRPr>
+            </a:lvl4pPr>
+            <a:lvl5pPr marL="1143000" indent="-228600" algn="l" defTabSz="914400" rtl="0" eaLnBrk="1" latinLnBrk="0" hangingPunct="1">
+              <a:spcBef>
+                <a:spcPts val="600"/>
+              </a:spcBef>
+              <a:buClr>
+                <a:schemeClr val="tx1">
+                  <a:lumMod val="50000"/>
+                  <a:lumOff val="50000"/>
+                </a:schemeClr>
+              </a:buClr>
+              <a:buSzPct val="70000"/>
+              <a:buFont typeface="Wingdings" pitchFamily="2" charset="2"/>
+              <a:buChar char="l"/>
+              <a:defRPr sz="1800" kern="1200">
+                <a:solidFill>
+                  <a:schemeClr val="tx1">
+                    <a:lumMod val="75000"/>
+                    <a:lumOff val="25000"/>
+                  </a:schemeClr>
+                </a:solidFill>
+                <a:latin typeface="+mn-lt"/>
+                <a:ea typeface="+mn-ea"/>
+                <a:cs typeface="+mn-cs"/>
+              </a:defRPr>
+            </a:lvl5pPr>
+            <a:lvl6pPr marL="1377950" indent="-228600" algn="l" defTabSz="914400" rtl="0" eaLnBrk="1" latinLnBrk="0" hangingPunct="1">
+              <a:spcBef>
+                <a:spcPct val="20000"/>
+              </a:spcBef>
+              <a:buClr>
+                <a:schemeClr val="tx1">
+                  <a:lumMod val="85000"/>
+                  <a:lumOff val="15000"/>
+                </a:schemeClr>
+              </a:buClr>
+              <a:buSzPct val="70000"/>
+              <a:buFont typeface="Wingdings" pitchFamily="2" charset="2"/>
+              <a:buChar char=""/>
+              <a:defRPr lang="en-US" sz="1800" kern="1200" dirty="0" smtClean="0">
+                <a:solidFill>
+                  <a:schemeClr val="tx1">
+                    <a:lumMod val="75000"/>
+                    <a:lumOff val="25000"/>
+                  </a:schemeClr>
+                </a:solidFill>
+                <a:latin typeface="+mn-lt"/>
+                <a:ea typeface="+mn-ea"/>
+                <a:cs typeface="+mn-cs"/>
+              </a:defRPr>
+            </a:lvl6pPr>
+            <a:lvl7pPr marL="1603375" indent="-228600" algn="l" defTabSz="914400" rtl="0" eaLnBrk="1" latinLnBrk="0" hangingPunct="1">
+              <a:spcBef>
+                <a:spcPct val="20000"/>
+              </a:spcBef>
+              <a:buClr>
+                <a:schemeClr val="tx1">
+                  <a:lumMod val="50000"/>
+                  <a:lumOff val="50000"/>
+                </a:schemeClr>
+              </a:buClr>
+              <a:buSzPct val="70000"/>
+              <a:buFont typeface="Wingdings" pitchFamily="2" charset="2"/>
+              <a:buChar char=""/>
+              <a:defRPr lang="en-US" sz="1800" kern="1200" dirty="0" smtClean="0">
+                <a:solidFill>
+                  <a:schemeClr val="tx1">
+                    <a:lumMod val="75000"/>
+                    <a:lumOff val="25000"/>
+                  </a:schemeClr>
+                </a:solidFill>
+                <a:latin typeface="+mn-lt"/>
+                <a:ea typeface="+mn-ea"/>
+                <a:cs typeface="+mn-cs"/>
+              </a:defRPr>
+            </a:lvl7pPr>
+            <a:lvl8pPr marL="1830388" indent="-228600" algn="l" defTabSz="914400" rtl="0" eaLnBrk="1" latinLnBrk="0" hangingPunct="1">
+              <a:spcBef>
+                <a:spcPct val="20000"/>
+              </a:spcBef>
+              <a:buClr>
+                <a:schemeClr val="tx1">
+                  <a:lumMod val="85000"/>
+                  <a:lumOff val="15000"/>
+                </a:schemeClr>
+              </a:buClr>
+              <a:buSzPct val="70000"/>
+              <a:buFont typeface="Wingdings" pitchFamily="2" charset="2"/>
+              <a:buChar char=""/>
+              <a:defRPr lang="en-US" sz="1800" kern="1200" dirty="0" smtClean="0">
+                <a:solidFill>
+                  <a:schemeClr val="tx1">
+                    <a:lumMod val="75000"/>
+                    <a:lumOff val="25000"/>
+                  </a:schemeClr>
+                </a:solidFill>
+                <a:latin typeface="+mn-lt"/>
+                <a:ea typeface="+mn-ea"/>
+                <a:cs typeface="+mn-cs"/>
+              </a:defRPr>
+            </a:lvl8pPr>
+            <a:lvl9pPr marL="2057400" indent="-228600" algn="l" defTabSz="914400" rtl="0" eaLnBrk="1" latinLnBrk="0" hangingPunct="1">
+              <a:spcBef>
+                <a:spcPct val="20000"/>
+              </a:spcBef>
+              <a:buClr>
+                <a:schemeClr val="tx1">
+                  <a:lumMod val="50000"/>
+                  <a:lumOff val="50000"/>
+                </a:schemeClr>
+              </a:buClr>
+              <a:buSzPct val="70000"/>
+              <a:buFont typeface="Wingdings" pitchFamily="2" charset="2"/>
+              <a:buChar char=""/>
+              <a:defRPr lang="en-US" sz="1800" kern="1200" dirty="0">
+                <a:solidFill>
+                  <a:schemeClr val="tx1">
+                    <a:lumMod val="75000"/>
+                    <a:lumOff val="25000"/>
+                  </a:schemeClr>
+                </a:solidFill>
+                <a:latin typeface="+mn-lt"/>
+                <a:ea typeface="+mn-ea"/>
+                <a:cs typeface="+mn-cs"/>
+              </a:defRPr>
+            </a:lvl9pPr>
+          </a:lstStyle>
+          <a:p>
+            <a:r>
+              <a:rPr lang="de-DE" dirty="0" err="1" smtClean="0"/>
+              <a:t>Shortwords</a:t>
+            </a:r>
+            <a:r>
+              <a:rPr lang="de-DE" dirty="0" smtClean="0"/>
+              <a:t> Filter</a:t>
+            </a:r>
+          </a:p>
+          <a:p>
+            <a:r>
+              <a:rPr lang="de-DE" dirty="0" err="1" smtClean="0"/>
+              <a:t>Unused</a:t>
+            </a:r>
+            <a:r>
+              <a:rPr lang="de-DE" dirty="0" smtClean="0"/>
+              <a:t> </a:t>
+            </a:r>
+            <a:r>
+              <a:rPr lang="de-DE" dirty="0" err="1" smtClean="0"/>
+              <a:t>Char</a:t>
+            </a:r>
+            <a:r>
+              <a:rPr lang="de-DE" dirty="0" smtClean="0"/>
+              <a:t> Filter</a:t>
+            </a:r>
           </a:p>
           <a:p>
             <a:r>
@@ -6009,7 +6379,7 @@
       </p:sp>
       <p:graphicFrame>
         <p:nvGraphicFramePr>
-          <p:cNvPr id="7" name="Inhaltsplatzhalter 6"/>
+          <p:cNvPr id="5" name="Inhaltsplatzhalter 4"/>
           <p:cNvGraphicFramePr>
             <a:graphicFrameLocks noGrp="1"/>
           </p:cNvGraphicFramePr>

</xml_diff>